<commit_message>
Update project documents for the end of the semester
</commit_message>
<xml_diff>
--- a/documents/Project Proposal Presentation.pptx
+++ b/documents/Project Proposal Presentation.pptx
@@ -5,7 +5,7 @@
     <p:sldMasterId id="2147483708" r:id="rId1"/>
   </p:sldMasterIdLst>
   <p:notesMasterIdLst>
-    <p:notesMasterId r:id="rId20"/>
+    <p:notesMasterId r:id="rId19"/>
   </p:notesMasterIdLst>
   <p:sldIdLst>
     <p:sldId id="256" r:id="rId2"/>
@@ -15,17 +15,16 @@
     <p:sldId id="260" r:id="rId6"/>
     <p:sldId id="261" r:id="rId7"/>
     <p:sldId id="262" r:id="rId8"/>
-    <p:sldId id="271" r:id="rId9"/>
-    <p:sldId id="275" r:id="rId10"/>
-    <p:sldId id="263" r:id="rId11"/>
-    <p:sldId id="265" r:id="rId12"/>
-    <p:sldId id="272" r:id="rId13"/>
-    <p:sldId id="273" r:id="rId14"/>
-    <p:sldId id="274" r:id="rId15"/>
-    <p:sldId id="266" r:id="rId16"/>
-    <p:sldId id="267" r:id="rId17"/>
-    <p:sldId id="268" r:id="rId18"/>
-    <p:sldId id="270" r:id="rId19"/>
+    <p:sldId id="275" r:id="rId9"/>
+    <p:sldId id="263" r:id="rId10"/>
+    <p:sldId id="265" r:id="rId11"/>
+    <p:sldId id="272" r:id="rId12"/>
+    <p:sldId id="273" r:id="rId13"/>
+    <p:sldId id="274" r:id="rId14"/>
+    <p:sldId id="266" r:id="rId15"/>
+    <p:sldId id="267" r:id="rId16"/>
+    <p:sldId id="268" r:id="rId17"/>
+    <p:sldId id="270" r:id="rId18"/>
   </p:sldIdLst>
   <p:sldSz cx="9144000" cy="6858000" type="screen4x3"/>
   <p:notesSz cx="6858000" cy="9144000"/>
@@ -209,7 +208,7 @@
           <a:p>
             <a:fld id="{0730BD42-9C44-41A9-8E91-70CB7E9844A5}" type="datetimeFigureOut">
               <a:rPr lang="en-US" smtClean="0"/>
-              <a:t>10/17/2012</a:t>
+              <a:t>12/5/2012</a:t>
             </a:fld>
             <a:endParaRPr lang="en-US"/>
           </a:p>
@@ -662,7 +661,7 @@
           <a:p>
             <a:fld id="{4F822CCE-4A6A-4DA0-8D37-6D7A7F2A136C}" type="datetime1">
               <a:rPr lang="en-US" smtClean="0"/>
-              <a:t>10/17/2012</a:t>
+              <a:t>12/5/2012</a:t>
             </a:fld>
             <a:endParaRPr lang="en-US"/>
           </a:p>
@@ -839,7 +838,7 @@
           <a:p>
             <a:fld id="{56F68073-1414-4433-8A76-FF3B10C5FAB8}" type="datetime1">
               <a:rPr lang="en-US" smtClean="0"/>
-              <a:t>10/17/2012</a:t>
+              <a:t>12/5/2012</a:t>
             </a:fld>
             <a:endParaRPr lang="en-US"/>
           </a:p>
@@ -1021,7 +1020,7 @@
           <a:p>
             <a:fld id="{93DD044C-5EC4-4421-B4D3-80E4939520A0}" type="datetime1">
               <a:rPr lang="en-US" smtClean="0"/>
-              <a:t>10/17/2012</a:t>
+              <a:t>12/5/2012</a:t>
             </a:fld>
             <a:endParaRPr lang="en-US"/>
           </a:p>
@@ -1230,7 +1229,7 @@
           <a:p>
             <a:fld id="{E9EA12D5-6E23-47A8-B1EF-419F73C1BF38}" type="datetime1">
               <a:rPr lang="en-US" smtClean="0"/>
-              <a:t>10/17/2012</a:t>
+              <a:t>12/5/2012</a:t>
             </a:fld>
             <a:endParaRPr lang="en-US"/>
           </a:p>
@@ -1478,7 +1477,7 @@
           <a:p>
             <a:fld id="{2D764A2E-7E3D-4FC4-A7C1-19462E029F90}" type="datetime1">
               <a:rPr lang="en-US" smtClean="0"/>
-              <a:t>10/17/2012</a:t>
+              <a:t>12/5/2012</a:t>
             </a:fld>
             <a:endParaRPr lang="en-US"/>
           </a:p>
@@ -1795,7 +1794,7 @@
           <a:p>
             <a:fld id="{C65348A5-C8F6-46E8-BB69-87465CEF37EC}" type="datetime1">
               <a:rPr lang="en-US" smtClean="0"/>
-              <a:t>10/17/2012</a:t>
+              <a:t>12/5/2012</a:t>
             </a:fld>
             <a:endParaRPr lang="en-US"/>
           </a:p>
@@ -2245,7 +2244,7 @@
           <a:p>
             <a:fld id="{C2B0C2C8-66AF-4CB9-BD56-D164E8A50EF6}" type="datetime1">
               <a:rPr lang="en-US" smtClean="0"/>
-              <a:t>10/17/2012</a:t>
+              <a:t>12/5/2012</a:t>
             </a:fld>
             <a:endParaRPr lang="en-US"/>
           </a:p>
@@ -2365,7 +2364,7 @@
           <a:p>
             <a:fld id="{3F363847-DFB1-491F-AF19-89D5AAFEE962}" type="datetime1">
               <a:rPr lang="en-US" smtClean="0"/>
-              <a:t>10/17/2012</a:t>
+              <a:t>12/5/2012</a:t>
             </a:fld>
             <a:endParaRPr lang="en-US"/>
           </a:p>
@@ -2462,7 +2461,7 @@
           <a:p>
             <a:fld id="{C99917ED-F515-4BFA-A21A-91C036862570}" type="datetime1">
               <a:rPr lang="en-US" smtClean="0"/>
-              <a:t>10/17/2012</a:t>
+              <a:t>12/5/2012</a:t>
             </a:fld>
             <a:endParaRPr lang="en-US"/>
           </a:p>
@@ -2754,7 +2753,7 @@
           <a:p>
             <a:fld id="{46540FAF-48D8-4588-8A12-4E9828B867E5}" type="datetime1">
               <a:rPr lang="en-US" smtClean="0"/>
-              <a:t>10/17/2012</a:t>
+              <a:t>12/5/2012</a:t>
             </a:fld>
             <a:endParaRPr lang="en-US"/>
           </a:p>
@@ -2952,7 +2951,7 @@
           <a:p>
             <a:fld id="{2378AAFD-1446-49A1-A10F-5F938F61E918}" type="datetime1">
               <a:rPr lang="en-US" smtClean="0"/>
-              <a:t>10/17/2012</a:t>
+              <a:t>12/5/2012</a:t>
             </a:fld>
             <a:endParaRPr lang="en-US"/>
           </a:p>
@@ -7510,7 +7509,7 @@
           <a:p>
             <a:fld id="{5D4D784C-1D0C-43FF-8F08-090690DDFCA7}" type="datetime1">
               <a:rPr lang="en-US" smtClean="0"/>
-              <a:t>10/17/2012</a:t>
+              <a:t>12/5/2012</a:t>
             </a:fld>
             <a:endParaRPr lang="en-US"/>
           </a:p>
@@ -8626,7 +8625,12 @@
             <p:ph type="ctrTitle"/>
           </p:nvPr>
         </p:nvSpPr>
-        <p:spPr/>
+        <p:spPr>
+          <a:xfrm>
+            <a:off x="990600" y="152400"/>
+            <a:ext cx="7117180" cy="1470025"/>
+          </a:xfrm>
+        </p:spPr>
         <p:txBody>
           <a:bodyPr/>
           <a:lstStyle/>
@@ -8656,7 +8660,12 @@
             <p:ph type="subTitle" idx="1"/>
           </p:nvPr>
         </p:nvSpPr>
-        <p:spPr/>
+        <p:spPr>
+          <a:xfrm>
+            <a:off x="1143000" y="1743075"/>
+            <a:ext cx="7117180" cy="861420"/>
+          </a:xfrm>
+        </p:spPr>
         <p:txBody>
           <a:bodyPr/>
           <a:lstStyle/>
@@ -8675,14 +8684,14 @@
       </p:sp>
       <p:pic>
         <p:nvPicPr>
-          <p:cNvPr id="8194" name="Picture 2" descr="http://d3j5vwomefv46c.cloudfront.net/photos/full/669942505.png?key=749800&amp;Expires=1350488296&amp;Key-Pair-Id=APKAIYVGSUJFNRFZBBTA&amp;Signature=DlAZ9UPqQZtoy4dNeDJmYttKEcmdQut5%7EdnfcLSz39VW9i4MeoWXbBlm79yCSIZdCPPZrfYovWZtXUM8jxWareron6YfVnxFV3YA7BbwWzmyKgiglBFMv3IL9GBTUtMa63A4AtT5h0QCfiwoXzBFgf95yDR3%7EeKprcss9oPO0H4_"/>
+          <p:cNvPr id="1026" name="Picture 2" descr="[Populated PCB]"/>
           <p:cNvPicPr>
             <a:picLocks noChangeAspect="1" noChangeArrowheads="1"/>
           </p:cNvPicPr>
           <p:nvPr/>
         </p:nvPicPr>
         <p:blipFill>
-          <a:blip r:embed="rId2" cstate="print">
+          <a:blip r:embed="rId2">
             <a:extLst>
               <a:ext uri="{28A0092B-C50C-407E-A947-70E740481C1C}">
                 <a14:useLocalDpi xmlns:a14="http://schemas.microsoft.com/office/drawing/2010/main" val="0"/>
@@ -8696,8 +8705,8 @@
         </p:blipFill>
         <p:spPr bwMode="auto">
           <a:xfrm>
-            <a:off x="2895600" y="228600"/>
-            <a:ext cx="2971800" cy="3174153"/>
+            <a:off x="3581400" y="1752600"/>
+            <a:ext cx="5257800" cy="4848693"/>
           </a:xfrm>
           <a:prstGeom prst="rect">
             <a:avLst/>
@@ -8724,11 +8733,11 @@
   <p:clrMapOvr>
     <a:masterClrMapping/>
   </p:clrMapOvr>
-  <mc:AlternateContent xmlns:mc="http://schemas.openxmlformats.org/markup-compatibility/2006">
-    <mc:Choice xmlns:p14="http://schemas.microsoft.com/office/powerpoint/2010/main" Requires="p14">
+  <mc:AlternateContent xmlns:mc="http://schemas.openxmlformats.org/markup-compatibility/2006" xmlns:p14="http://schemas.microsoft.com/office/powerpoint/2010/main">
+    <mc:Choice Requires="p14">
       <p:transition spd="slow" p14:dur="2000"/>
     </mc:Choice>
-    <mc:Fallback>
+    <mc:Fallback xmlns="">
       <p:transition spd="slow"/>
     </mc:Fallback>
   </mc:AlternateContent>
@@ -8776,48 +8785,15 @@
           <a:p>
             <a:r>
               <a:rPr lang="en-US" dirty="0" smtClean="0"/>
-              <a:t>High Level Block Diagram</a:t>
+              <a:t>Schematic</a:t>
             </a:r>
             <a:endParaRPr lang="en-US" dirty="0"/>
           </a:p>
         </p:txBody>
       </p:sp>
-      <p:pic>
-        <p:nvPicPr>
-          <p:cNvPr id="6" name="Picture 5"/>
-          <p:cNvPicPr/>
-          <p:nvPr/>
-        </p:nvPicPr>
-        <p:blipFill>
-          <a:blip r:embed="rId2" cstate="print">
-            <a:extLst>
-              <a:ext uri="{28A0092B-C50C-407E-A947-70E740481C1C}">
-                <a14:useLocalDpi xmlns:a14="http://schemas.microsoft.com/office/drawing/2010/main" val="0"/>
-              </a:ext>
-            </a:extLst>
-          </a:blip>
-          <a:srcRect/>
-          <a:stretch>
-            <a:fillRect/>
-          </a:stretch>
-        </p:blipFill>
-        <p:spPr bwMode="auto">
-          <a:xfrm>
-            <a:off x="1372340" y="1828800"/>
-            <a:ext cx="5943600" cy="4563745"/>
-          </a:xfrm>
-          <a:prstGeom prst="rect">
-            <a:avLst/>
-          </a:prstGeom>
-          <a:noFill/>
-          <a:ln>
-            <a:noFill/>
-          </a:ln>
-        </p:spPr>
-      </p:pic>
-      <p:sp>
-        <p:nvSpPr>
-          <p:cNvPr id="7" name="Slide Number Placeholder 6"/>
+      <p:sp>
+        <p:nvSpPr>
+          <p:cNvPr id="5" name="Slide Number Placeholder 4"/>
           <p:cNvSpPr>
             <a:spLocks noGrp="1"/>
           </p:cNvSpPr>
@@ -8838,75 +8814,13 @@
           </a:p>
         </p:txBody>
       </p:sp>
-    </p:spTree>
-    <p:extLst>
-      <p:ext uri="{BB962C8B-B14F-4D97-AF65-F5344CB8AC3E}">
-        <p14:creationId xmlns:p14="http://schemas.microsoft.com/office/powerpoint/2010/main" val="2983298933"/>
-      </p:ext>
-    </p:extLst>
-  </p:cSld>
-  <p:clrMapOvr>
-    <a:masterClrMapping/>
-  </p:clrMapOvr>
-  <p:timing>
-    <p:tnLst>
-      <p:par>
-        <p:cTn id="1" dur="indefinite" restart="never" nodeType="tmRoot"/>
-      </p:par>
-    </p:tnLst>
-  </p:timing>
-</p:sld>
-</file>
-
-<file path=ppt/slides/slide11.xml><?xml version="1.0" encoding="utf-8"?>
-<p:sld xmlns:a="http://schemas.openxmlformats.org/drawingml/2006/main" xmlns:r="http://schemas.openxmlformats.org/officeDocument/2006/relationships" xmlns:p="http://schemas.openxmlformats.org/presentationml/2006/main">
-  <p:cSld>
-    <p:spTree>
-      <p:nvGrpSpPr>
-        <p:cNvPr id="1" name=""/>
-        <p:cNvGrpSpPr/>
-        <p:nvPr/>
-      </p:nvGrpSpPr>
-      <p:grpSpPr>
-        <a:xfrm>
-          <a:off x="0" y="0"/>
-          <a:ext cx="0" cy="0"/>
-          <a:chOff x="0" y="0"/>
-          <a:chExt cx="0" cy="0"/>
-        </a:xfrm>
-      </p:grpSpPr>
-      <p:sp>
-        <p:nvSpPr>
-          <p:cNvPr id="2" name="Title 1"/>
-          <p:cNvSpPr>
-            <a:spLocks noGrp="1"/>
-          </p:cNvSpPr>
-          <p:nvPr>
-            <p:ph type="title"/>
-          </p:nvPr>
-        </p:nvSpPr>
-        <p:spPr/>
-        <p:txBody>
-          <a:bodyPr/>
-          <a:lstStyle/>
-          <a:p>
-            <a:r>
-              <a:rPr lang="en-US" dirty="0" smtClean="0"/>
-              <a:t>Schematic</a:t>
-            </a:r>
-            <a:endParaRPr lang="en-US" dirty="0"/>
-          </a:p>
-        </p:txBody>
-      </p:sp>
       <p:pic>
         <p:nvPicPr>
-          <p:cNvPr id="4098" name="Picture 2"/>
+          <p:cNvPr id="2050" name="Picture 2"/>
           <p:cNvPicPr>
-            <a:picLocks noGrp="1" noChangeAspect="1" noChangeArrowheads="1"/>
+            <a:picLocks noChangeAspect="1" noChangeArrowheads="1"/>
           </p:cNvPicPr>
-          <p:nvPr>
-            <p:ph idx="1"/>
-          </p:nvPr>
+          <p:nvPr/>
         </p:nvPicPr>
         <p:blipFill>
           <a:blip r:embed="rId2">
@@ -8923,8 +8837,8 @@
         </p:blipFill>
         <p:spPr bwMode="auto">
           <a:xfrm>
-            <a:off x="1524000" y="1524000"/>
-            <a:ext cx="6096000" cy="4724643"/>
+            <a:off x="228600" y="1371600"/>
+            <a:ext cx="8763000" cy="2754452"/>
           </a:xfrm>
           <a:prstGeom prst="rect">
             <a:avLst/>
@@ -8964,101 +8878,16 @@
           </a:extLst>
         </p:spPr>
       </p:pic>
-      <p:sp>
-        <p:nvSpPr>
-          <p:cNvPr id="5" name="Slide Number Placeholder 4"/>
-          <p:cNvSpPr>
-            <a:spLocks noGrp="1"/>
-          </p:cNvSpPr>
-          <p:nvPr>
-            <p:ph type="sldNum" sz="quarter" idx="12"/>
-          </p:nvPr>
-        </p:nvSpPr>
-        <p:spPr/>
-        <p:txBody>
-          <a:bodyPr/>
-          <a:lstStyle/>
-          <a:p>
-            <a:fld id="{7E6EE00F-83CB-43DE-ADF5-FEF2BD354890}" type="slidenum">
-              <a:rPr lang="en-US" smtClean="0"/>
-              <a:t>11</a:t>
-            </a:fld>
-            <a:endParaRPr lang="en-US"/>
-          </a:p>
-        </p:txBody>
-      </p:sp>
-    </p:spTree>
-    <p:extLst>
-      <p:ext uri="{BB962C8B-B14F-4D97-AF65-F5344CB8AC3E}">
-        <p14:creationId xmlns:p14="http://schemas.microsoft.com/office/powerpoint/2010/main" val="4225769044"/>
-      </p:ext>
-    </p:extLst>
-  </p:cSld>
-  <p:clrMapOvr>
-    <a:masterClrMapping/>
-  </p:clrMapOvr>
-  <p:timing>
-    <p:tnLst>
-      <p:par>
-        <p:cTn id="1" dur="indefinite" restart="never" nodeType="tmRoot"/>
-      </p:par>
-    </p:tnLst>
-  </p:timing>
-</p:sld>
-</file>
-
-<file path=ppt/slides/slide12.xml><?xml version="1.0" encoding="utf-8"?>
-<p:sld xmlns:a="http://schemas.openxmlformats.org/drawingml/2006/main" xmlns:r="http://schemas.openxmlformats.org/officeDocument/2006/relationships" xmlns:p="http://schemas.openxmlformats.org/presentationml/2006/main">
-  <p:cSld>
-    <p:spTree>
-      <p:nvGrpSpPr>
-        <p:cNvPr id="1" name=""/>
-        <p:cNvGrpSpPr/>
-        <p:nvPr/>
-      </p:nvGrpSpPr>
-      <p:grpSpPr>
-        <a:xfrm>
-          <a:off x="0" y="0"/>
-          <a:ext cx="0" cy="0"/>
-          <a:chOff x="0" y="0"/>
-          <a:chExt cx="0" cy="0"/>
-        </a:xfrm>
-      </p:grpSpPr>
-      <p:sp>
-        <p:nvSpPr>
-          <p:cNvPr id="2" name="Title 1"/>
-          <p:cNvSpPr>
-            <a:spLocks noGrp="1"/>
-          </p:cNvSpPr>
-          <p:nvPr>
-            <p:ph type="title"/>
-          </p:nvPr>
-        </p:nvSpPr>
-        <p:spPr/>
-        <p:txBody>
-          <a:bodyPr/>
-          <a:lstStyle/>
-          <a:p>
-            <a:r>
-              <a:rPr lang="en-US" dirty="0" smtClean="0"/>
-              <a:t>Schematic</a:t>
-            </a:r>
-            <a:endParaRPr lang="en-US" dirty="0"/>
-          </a:p>
-        </p:txBody>
-      </p:sp>
       <p:pic>
         <p:nvPicPr>
-          <p:cNvPr id="5122" name="Picture 2"/>
+          <p:cNvPr id="2051" name="Picture 3"/>
           <p:cNvPicPr>
-            <a:picLocks noGrp="1" noChangeAspect="1" noChangeArrowheads="1"/>
+            <a:picLocks noChangeAspect="1" noChangeArrowheads="1"/>
           </p:cNvPicPr>
-          <p:nvPr>
-            <p:ph idx="1"/>
-          </p:nvPr>
+          <p:nvPr/>
         </p:nvPicPr>
         <p:blipFill>
-          <a:blip r:embed="rId2">
+          <a:blip r:embed="rId3">
             <a:extLst>
               <a:ext uri="{28A0092B-C50C-407E-A947-70E740481C1C}">
                 <a14:useLocalDpi xmlns:a14="http://schemas.microsoft.com/office/drawing/2010/main" val="0"/>
@@ -9072,8 +8901,8 @@
         </p:blipFill>
         <p:spPr bwMode="auto">
           <a:xfrm>
-            <a:off x="1524000" y="1524000"/>
-            <a:ext cx="6400800" cy="4960875"/>
+            <a:off x="1625723" y="3330606"/>
+            <a:ext cx="4038600" cy="3463938"/>
           </a:xfrm>
           <a:prstGeom prst="rect">
             <a:avLst/>
@@ -9113,101 +8942,16 @@
           </a:extLst>
         </p:spPr>
       </p:pic>
-      <p:sp>
-        <p:nvSpPr>
-          <p:cNvPr id="4" name="Slide Number Placeholder 3"/>
-          <p:cNvSpPr>
-            <a:spLocks noGrp="1"/>
-          </p:cNvSpPr>
-          <p:nvPr>
-            <p:ph type="sldNum" sz="quarter" idx="12"/>
-          </p:nvPr>
-        </p:nvSpPr>
-        <p:spPr/>
-        <p:txBody>
-          <a:bodyPr/>
-          <a:lstStyle/>
-          <a:p>
-            <a:fld id="{7E6EE00F-83CB-43DE-ADF5-FEF2BD354890}" type="slidenum">
-              <a:rPr lang="en-US" smtClean="0"/>
-              <a:t>12</a:t>
-            </a:fld>
-            <a:endParaRPr lang="en-US"/>
-          </a:p>
-        </p:txBody>
-      </p:sp>
-    </p:spTree>
-    <p:extLst>
-      <p:ext uri="{BB962C8B-B14F-4D97-AF65-F5344CB8AC3E}">
-        <p14:creationId xmlns:p14="http://schemas.microsoft.com/office/powerpoint/2010/main" val="2349533824"/>
-      </p:ext>
-    </p:extLst>
-  </p:cSld>
-  <p:clrMapOvr>
-    <a:masterClrMapping/>
-  </p:clrMapOvr>
-  <p:timing>
-    <p:tnLst>
-      <p:par>
-        <p:cTn id="1" dur="indefinite" restart="never" nodeType="tmRoot"/>
-      </p:par>
-    </p:tnLst>
-  </p:timing>
-</p:sld>
-</file>
-
-<file path=ppt/slides/slide13.xml><?xml version="1.0" encoding="utf-8"?>
-<p:sld xmlns:a="http://schemas.openxmlformats.org/drawingml/2006/main" xmlns:r="http://schemas.openxmlformats.org/officeDocument/2006/relationships" xmlns:p="http://schemas.openxmlformats.org/presentationml/2006/main">
-  <p:cSld>
-    <p:spTree>
-      <p:nvGrpSpPr>
-        <p:cNvPr id="1" name=""/>
-        <p:cNvGrpSpPr/>
-        <p:nvPr/>
-      </p:nvGrpSpPr>
-      <p:grpSpPr>
-        <a:xfrm>
-          <a:off x="0" y="0"/>
-          <a:ext cx="0" cy="0"/>
-          <a:chOff x="0" y="0"/>
-          <a:chExt cx="0" cy="0"/>
-        </a:xfrm>
-      </p:grpSpPr>
-      <p:sp>
-        <p:nvSpPr>
-          <p:cNvPr id="2" name="Title 1"/>
-          <p:cNvSpPr>
-            <a:spLocks noGrp="1"/>
-          </p:cNvSpPr>
-          <p:nvPr>
-            <p:ph type="title"/>
-          </p:nvPr>
-        </p:nvSpPr>
-        <p:spPr/>
-        <p:txBody>
-          <a:bodyPr/>
-          <a:lstStyle/>
-          <a:p>
-            <a:r>
-              <a:rPr lang="en-US" dirty="0" smtClean="0"/>
-              <a:t>Schematic</a:t>
-            </a:r>
-            <a:endParaRPr lang="en-US" dirty="0"/>
-          </a:p>
-        </p:txBody>
-      </p:sp>
       <p:pic>
         <p:nvPicPr>
-          <p:cNvPr id="6146" name="Picture 2"/>
+          <p:cNvPr id="2052" name="Picture 4"/>
           <p:cNvPicPr>
-            <a:picLocks noGrp="1" noChangeAspect="1" noChangeArrowheads="1"/>
+            <a:picLocks noChangeAspect="1" noChangeArrowheads="1"/>
           </p:cNvPicPr>
-          <p:nvPr>
-            <p:ph idx="1"/>
-          </p:nvPr>
+          <p:nvPr/>
         </p:nvPicPr>
         <p:blipFill>
-          <a:blip r:embed="rId2">
+          <a:blip r:embed="rId4">
             <a:extLst>
               <a:ext uri="{28A0092B-C50C-407E-A947-70E740481C1C}">
                 <a14:useLocalDpi xmlns:a14="http://schemas.microsoft.com/office/drawing/2010/main" val="0"/>
@@ -9221,8 +8965,8 @@
         </p:blipFill>
         <p:spPr bwMode="auto">
           <a:xfrm>
-            <a:off x="1371600" y="1447800"/>
-            <a:ext cx="6629400" cy="5138049"/>
+            <a:off x="5664323" y="3797464"/>
+            <a:ext cx="3276600" cy="2997080"/>
           </a:xfrm>
           <a:prstGeom prst="rect">
             <a:avLst/>
@@ -9262,33 +9006,10 @@
           </a:extLst>
         </p:spPr>
       </p:pic>
-      <p:sp>
-        <p:nvSpPr>
-          <p:cNvPr id="4" name="Slide Number Placeholder 3"/>
-          <p:cNvSpPr>
-            <a:spLocks noGrp="1"/>
-          </p:cNvSpPr>
-          <p:nvPr>
-            <p:ph type="sldNum" sz="quarter" idx="12"/>
-          </p:nvPr>
-        </p:nvSpPr>
-        <p:spPr/>
-        <p:txBody>
-          <a:bodyPr/>
-          <a:lstStyle/>
-          <a:p>
-            <a:fld id="{7E6EE00F-83CB-43DE-ADF5-FEF2BD354890}" type="slidenum">
-              <a:rPr lang="en-US" smtClean="0"/>
-              <a:t>13</a:t>
-            </a:fld>
-            <a:endParaRPr lang="en-US"/>
-          </a:p>
-        </p:txBody>
-      </p:sp>
     </p:spTree>
     <p:extLst>
       <p:ext uri="{BB962C8B-B14F-4D97-AF65-F5344CB8AC3E}">
-        <p14:creationId xmlns:p14="http://schemas.microsoft.com/office/powerpoint/2010/main" val="2420975837"/>
+        <p14:creationId xmlns:p14="http://schemas.microsoft.com/office/powerpoint/2010/main" val="4225769044"/>
       </p:ext>
     </p:extLst>
   </p:cSld>
@@ -9305,7 +9026,7 @@
 </p:sld>
 </file>
 
-<file path=ppt/slides/slide14.xml><?xml version="1.0" encoding="utf-8"?>
+<file path=ppt/slides/slide11.xml><?xml version="1.0" encoding="utf-8"?>
 <p:sld xmlns:a="http://schemas.openxmlformats.org/drawingml/2006/main" xmlns:r="http://schemas.openxmlformats.org/officeDocument/2006/relationships" xmlns:p="http://schemas.openxmlformats.org/presentationml/2006/main">
   <p:cSld>
     <p:spTree>
@@ -9332,7 +9053,12 @@
             <p:ph type="title"/>
           </p:nvPr>
         </p:nvSpPr>
-        <p:spPr/>
+        <p:spPr>
+          <a:xfrm>
+            <a:off x="1046430" y="6790"/>
+            <a:ext cx="7125113" cy="924475"/>
+          </a:xfrm>
+        </p:spPr>
         <p:txBody>
           <a:bodyPr/>
           <a:lstStyle/>
@@ -9345,15 +9071,36 @@
           </a:p>
         </p:txBody>
       </p:sp>
+      <p:sp>
+        <p:nvSpPr>
+          <p:cNvPr id="4" name="Slide Number Placeholder 3"/>
+          <p:cNvSpPr>
+            <a:spLocks noGrp="1"/>
+          </p:cNvSpPr>
+          <p:nvPr>
+            <p:ph type="sldNum" sz="quarter" idx="12"/>
+          </p:nvPr>
+        </p:nvSpPr>
+        <p:spPr/>
+        <p:txBody>
+          <a:bodyPr/>
+          <a:lstStyle/>
+          <a:p>
+            <a:fld id="{7E6EE00F-83CB-43DE-ADF5-FEF2BD354890}" type="slidenum">
+              <a:rPr lang="en-US" smtClean="0"/>
+              <a:t>11</a:t>
+            </a:fld>
+            <a:endParaRPr lang="en-US"/>
+          </a:p>
+        </p:txBody>
+      </p:sp>
       <p:pic>
         <p:nvPicPr>
-          <p:cNvPr id="7170" name="Picture 2"/>
+          <p:cNvPr id="3" name="Picture 2"/>
           <p:cNvPicPr>
-            <a:picLocks noGrp="1" noChangeAspect="1" noChangeArrowheads="1"/>
+            <a:picLocks noChangeAspect="1" noChangeArrowheads="1"/>
           </p:cNvPicPr>
-          <p:nvPr>
-            <p:ph idx="1"/>
-          </p:nvPr>
+          <p:nvPr/>
         </p:nvPicPr>
         <p:blipFill>
           <a:blip r:embed="rId2">
@@ -9370,8 +9117,8 @@
         </p:blipFill>
         <p:spPr bwMode="auto">
           <a:xfrm>
-            <a:off x="1524000" y="1828800"/>
-            <a:ext cx="6172200" cy="4783701"/>
+            <a:off x="990600" y="747793"/>
+            <a:ext cx="8077200" cy="6023675"/>
           </a:xfrm>
           <a:prstGeom prst="rect">
             <a:avLst/>
@@ -9411,9 +9158,479 @@
           </a:extLst>
         </p:spPr>
       </p:pic>
+    </p:spTree>
+    <p:extLst>
+      <p:ext uri="{BB962C8B-B14F-4D97-AF65-F5344CB8AC3E}">
+        <p14:creationId xmlns:p14="http://schemas.microsoft.com/office/powerpoint/2010/main" val="2349533824"/>
+      </p:ext>
+    </p:extLst>
+  </p:cSld>
+  <p:clrMapOvr>
+    <a:masterClrMapping/>
+  </p:clrMapOvr>
+  <p:timing>
+    <p:tnLst>
+      <p:par>
+        <p:cTn id="1" dur="indefinite" restart="never" nodeType="tmRoot"/>
+      </p:par>
+    </p:tnLst>
+  </p:timing>
+</p:sld>
+</file>
+
+<file path=ppt/slides/slide12.xml><?xml version="1.0" encoding="utf-8"?>
+<p:sld xmlns:a="http://schemas.openxmlformats.org/drawingml/2006/main" xmlns:r="http://schemas.openxmlformats.org/officeDocument/2006/relationships" xmlns:p="http://schemas.openxmlformats.org/presentationml/2006/main">
+  <p:cSld>
+    <p:spTree>
+      <p:nvGrpSpPr>
+        <p:cNvPr id="1" name=""/>
+        <p:cNvGrpSpPr/>
+        <p:nvPr/>
+      </p:nvGrpSpPr>
+      <p:grpSpPr>
+        <a:xfrm>
+          <a:off x="0" y="0"/>
+          <a:ext cx="0" cy="0"/>
+          <a:chOff x="0" y="0"/>
+          <a:chExt cx="0" cy="0"/>
+        </a:xfrm>
+      </p:grpSpPr>
+      <p:sp>
+        <p:nvSpPr>
+          <p:cNvPr id="2" name="Title 1"/>
+          <p:cNvSpPr>
+            <a:spLocks noGrp="1"/>
+          </p:cNvSpPr>
+          <p:nvPr>
+            <p:ph type="title"/>
+          </p:nvPr>
+        </p:nvSpPr>
+        <p:spPr>
+          <a:xfrm>
+            <a:off x="990600" y="152400"/>
+            <a:ext cx="7125113" cy="924475"/>
+          </a:xfrm>
+        </p:spPr>
+        <p:txBody>
+          <a:bodyPr/>
+          <a:lstStyle/>
+          <a:p>
+            <a:r>
+              <a:rPr lang="en-US" dirty="0" smtClean="0"/>
+              <a:t>Schematic</a:t>
+            </a:r>
+            <a:endParaRPr lang="en-US" dirty="0"/>
+          </a:p>
+        </p:txBody>
+      </p:sp>
       <p:sp>
         <p:nvSpPr>
           <p:cNvPr id="4" name="Slide Number Placeholder 3"/>
+          <p:cNvSpPr>
+            <a:spLocks noGrp="1"/>
+          </p:cNvSpPr>
+          <p:nvPr>
+            <p:ph type="sldNum" sz="quarter" idx="12"/>
+          </p:nvPr>
+        </p:nvSpPr>
+        <p:spPr/>
+        <p:txBody>
+          <a:bodyPr/>
+          <a:lstStyle/>
+          <a:p>
+            <a:fld id="{7E6EE00F-83CB-43DE-ADF5-FEF2BD354890}" type="slidenum">
+              <a:rPr lang="en-US" smtClean="0"/>
+              <a:t>12</a:t>
+            </a:fld>
+            <a:endParaRPr lang="en-US"/>
+          </a:p>
+        </p:txBody>
+      </p:sp>
+      <p:pic>
+        <p:nvPicPr>
+          <p:cNvPr id="4098" name="Picture 2"/>
+          <p:cNvPicPr>
+            <a:picLocks noChangeAspect="1" noChangeArrowheads="1"/>
+          </p:cNvPicPr>
+          <p:nvPr/>
+        </p:nvPicPr>
+        <p:blipFill>
+          <a:blip r:embed="rId2">
+            <a:extLst>
+              <a:ext uri="{28A0092B-C50C-407E-A947-70E740481C1C}">
+                <a14:useLocalDpi xmlns:a14="http://schemas.microsoft.com/office/drawing/2010/main" val="0"/>
+              </a:ext>
+            </a:extLst>
+          </a:blip>
+          <a:srcRect/>
+          <a:stretch>
+            <a:fillRect/>
+          </a:stretch>
+        </p:blipFill>
+        <p:spPr bwMode="auto">
+          <a:xfrm>
+            <a:off x="1009094" y="990600"/>
+            <a:ext cx="8098839" cy="5410200"/>
+          </a:xfrm>
+          <a:prstGeom prst="rect">
+            <a:avLst/>
+          </a:prstGeom>
+          <a:noFill/>
+          <a:ln>
+            <a:noFill/>
+          </a:ln>
+          <a:effectLst/>
+          <a:extLst>
+            <a:ext uri="{909E8E84-426E-40DD-AFC4-6F175D3DCCD1}">
+              <a14:hiddenFill xmlns:a14="http://schemas.microsoft.com/office/drawing/2010/main">
+                <a:solidFill>
+                  <a:schemeClr val="accent1"/>
+                </a:solidFill>
+              </a14:hiddenFill>
+            </a:ext>
+            <a:ext uri="{91240B29-F687-4F45-9708-019B960494DF}">
+              <a14:hiddenLine xmlns:a14="http://schemas.microsoft.com/office/drawing/2010/main" w="9525">
+                <a:solidFill>
+                  <a:schemeClr val="tx1"/>
+                </a:solidFill>
+                <a:miter lim="800000"/>
+                <a:headEnd/>
+                <a:tailEnd/>
+              </a14:hiddenLine>
+            </a:ext>
+            <a:ext uri="{AF507438-7753-43E0-B8FC-AC1667EBCBE1}">
+              <a14:hiddenEffects xmlns:a14="http://schemas.microsoft.com/office/drawing/2010/main">
+                <a:effectLst>
+                  <a:outerShdw dist="35921" dir="2700000" algn="ctr" rotWithShape="0">
+                    <a:schemeClr val="bg2"/>
+                  </a:outerShdw>
+                </a:effectLst>
+              </a14:hiddenEffects>
+            </a:ext>
+          </a:extLst>
+        </p:spPr>
+      </p:pic>
+      <p:pic>
+        <p:nvPicPr>
+          <p:cNvPr id="4099" name="Picture 3"/>
+          <p:cNvPicPr>
+            <a:picLocks noChangeAspect="1" noChangeArrowheads="1"/>
+          </p:cNvPicPr>
+          <p:nvPr/>
+        </p:nvPicPr>
+        <p:blipFill>
+          <a:blip r:embed="rId3">
+            <a:extLst>
+              <a:ext uri="{28A0092B-C50C-407E-A947-70E740481C1C}">
+                <a14:useLocalDpi xmlns:a14="http://schemas.microsoft.com/office/drawing/2010/main" val="0"/>
+              </a:ext>
+            </a:extLst>
+          </a:blip>
+          <a:srcRect/>
+          <a:stretch>
+            <a:fillRect/>
+          </a:stretch>
+        </p:blipFill>
+        <p:spPr bwMode="auto">
+          <a:xfrm>
+            <a:off x="152400" y="990600"/>
+            <a:ext cx="2057400" cy="2232498"/>
+          </a:xfrm>
+          <a:prstGeom prst="rect">
+            <a:avLst/>
+          </a:prstGeom>
+          <a:noFill/>
+          <a:ln>
+            <a:noFill/>
+          </a:ln>
+          <a:effectLst/>
+          <a:extLst>
+            <a:ext uri="{909E8E84-426E-40DD-AFC4-6F175D3DCCD1}">
+              <a14:hiddenFill xmlns:a14="http://schemas.microsoft.com/office/drawing/2010/main">
+                <a:solidFill>
+                  <a:schemeClr val="accent1"/>
+                </a:solidFill>
+              </a14:hiddenFill>
+            </a:ext>
+            <a:ext uri="{91240B29-F687-4F45-9708-019B960494DF}">
+              <a14:hiddenLine xmlns:a14="http://schemas.microsoft.com/office/drawing/2010/main" w="9525">
+                <a:solidFill>
+                  <a:schemeClr val="tx1"/>
+                </a:solidFill>
+                <a:miter lim="800000"/>
+                <a:headEnd/>
+                <a:tailEnd/>
+              </a14:hiddenLine>
+            </a:ext>
+            <a:ext uri="{AF507438-7753-43E0-B8FC-AC1667EBCBE1}">
+              <a14:hiddenEffects xmlns:a14="http://schemas.microsoft.com/office/drawing/2010/main">
+                <a:effectLst>
+                  <a:outerShdw dist="35921" dir="2700000" algn="ctr" rotWithShape="0">
+                    <a:schemeClr val="bg2"/>
+                  </a:outerShdw>
+                </a:effectLst>
+              </a14:hiddenEffects>
+            </a:ext>
+          </a:extLst>
+        </p:spPr>
+      </p:pic>
+    </p:spTree>
+    <p:extLst>
+      <p:ext uri="{BB962C8B-B14F-4D97-AF65-F5344CB8AC3E}">
+        <p14:creationId xmlns:p14="http://schemas.microsoft.com/office/powerpoint/2010/main" val="2420975837"/>
+      </p:ext>
+    </p:extLst>
+  </p:cSld>
+  <p:clrMapOvr>
+    <a:masterClrMapping/>
+  </p:clrMapOvr>
+  <p:timing>
+    <p:tnLst>
+      <p:par>
+        <p:cTn id="1" dur="indefinite" restart="never" nodeType="tmRoot"/>
+      </p:par>
+    </p:tnLst>
+  </p:timing>
+</p:sld>
+</file>
+
+<file path=ppt/slides/slide13.xml><?xml version="1.0" encoding="utf-8"?>
+<p:sld xmlns:a="http://schemas.openxmlformats.org/drawingml/2006/main" xmlns:r="http://schemas.openxmlformats.org/officeDocument/2006/relationships" xmlns:p="http://schemas.openxmlformats.org/presentationml/2006/main">
+  <p:cSld>
+    <p:spTree>
+      <p:nvGrpSpPr>
+        <p:cNvPr id="1" name=""/>
+        <p:cNvGrpSpPr/>
+        <p:nvPr/>
+      </p:nvGrpSpPr>
+      <p:grpSpPr>
+        <a:xfrm>
+          <a:off x="0" y="0"/>
+          <a:ext cx="0" cy="0"/>
+          <a:chOff x="0" y="0"/>
+          <a:chExt cx="0" cy="0"/>
+        </a:xfrm>
+      </p:grpSpPr>
+      <p:sp>
+        <p:nvSpPr>
+          <p:cNvPr id="2" name="Title 1"/>
+          <p:cNvSpPr>
+            <a:spLocks noGrp="1"/>
+          </p:cNvSpPr>
+          <p:nvPr>
+            <p:ph type="title"/>
+          </p:nvPr>
+        </p:nvSpPr>
+        <p:spPr>
+          <a:xfrm>
+            <a:off x="838200" y="0"/>
+            <a:ext cx="7125113" cy="924475"/>
+          </a:xfrm>
+        </p:spPr>
+        <p:txBody>
+          <a:bodyPr/>
+          <a:lstStyle/>
+          <a:p>
+            <a:r>
+              <a:rPr lang="en-US" dirty="0" smtClean="0"/>
+              <a:t>Schematic</a:t>
+            </a:r>
+            <a:endParaRPr lang="en-US" dirty="0"/>
+          </a:p>
+        </p:txBody>
+      </p:sp>
+      <p:sp>
+        <p:nvSpPr>
+          <p:cNvPr id="4" name="Slide Number Placeholder 3"/>
+          <p:cNvSpPr>
+            <a:spLocks noGrp="1"/>
+          </p:cNvSpPr>
+          <p:nvPr>
+            <p:ph type="sldNum" sz="quarter" idx="12"/>
+          </p:nvPr>
+        </p:nvSpPr>
+        <p:spPr/>
+        <p:txBody>
+          <a:bodyPr/>
+          <a:lstStyle/>
+          <a:p>
+            <a:fld id="{7E6EE00F-83CB-43DE-ADF5-FEF2BD354890}" type="slidenum">
+              <a:rPr lang="en-US" smtClean="0"/>
+              <a:t>13</a:t>
+            </a:fld>
+            <a:endParaRPr lang="en-US"/>
+          </a:p>
+        </p:txBody>
+      </p:sp>
+      <p:pic>
+        <p:nvPicPr>
+          <p:cNvPr id="3074" name="Picture 2"/>
+          <p:cNvPicPr>
+            <a:picLocks noChangeAspect="1" noChangeArrowheads="1"/>
+          </p:cNvPicPr>
+          <p:nvPr/>
+        </p:nvPicPr>
+        <p:blipFill>
+          <a:blip r:embed="rId2">
+            <a:extLst>
+              <a:ext uri="{28A0092B-C50C-407E-A947-70E740481C1C}">
+                <a14:useLocalDpi xmlns:a14="http://schemas.microsoft.com/office/drawing/2010/main" val="0"/>
+              </a:ext>
+            </a:extLst>
+          </a:blip>
+          <a:srcRect/>
+          <a:stretch>
+            <a:fillRect/>
+          </a:stretch>
+        </p:blipFill>
+        <p:spPr bwMode="auto">
+          <a:xfrm>
+            <a:off x="381000" y="838199"/>
+            <a:ext cx="8305800" cy="5138231"/>
+          </a:xfrm>
+          <a:prstGeom prst="rect">
+            <a:avLst/>
+          </a:prstGeom>
+          <a:noFill/>
+          <a:ln>
+            <a:noFill/>
+          </a:ln>
+          <a:effectLst/>
+          <a:extLst>
+            <a:ext uri="{909E8E84-426E-40DD-AFC4-6F175D3DCCD1}">
+              <a14:hiddenFill xmlns:a14="http://schemas.microsoft.com/office/drawing/2010/main">
+                <a:solidFill>
+                  <a:schemeClr val="accent1"/>
+                </a:solidFill>
+              </a14:hiddenFill>
+            </a:ext>
+            <a:ext uri="{91240B29-F687-4F45-9708-019B960494DF}">
+              <a14:hiddenLine xmlns:a14="http://schemas.microsoft.com/office/drawing/2010/main" w="9525">
+                <a:solidFill>
+                  <a:schemeClr val="tx1"/>
+                </a:solidFill>
+                <a:miter lim="800000"/>
+                <a:headEnd/>
+                <a:tailEnd/>
+              </a14:hiddenLine>
+            </a:ext>
+            <a:ext uri="{AF507438-7753-43E0-B8FC-AC1667EBCBE1}">
+              <a14:hiddenEffects xmlns:a14="http://schemas.microsoft.com/office/drawing/2010/main">
+                <a:effectLst>
+                  <a:outerShdw dist="35921" dir="2700000" algn="ctr" rotWithShape="0">
+                    <a:schemeClr val="bg2"/>
+                  </a:outerShdw>
+                </a:effectLst>
+              </a14:hiddenEffects>
+            </a:ext>
+          </a:extLst>
+        </p:spPr>
+      </p:pic>
+    </p:spTree>
+    <p:extLst>
+      <p:ext uri="{BB962C8B-B14F-4D97-AF65-F5344CB8AC3E}">
+        <p14:creationId xmlns:p14="http://schemas.microsoft.com/office/powerpoint/2010/main" val="1339905903"/>
+      </p:ext>
+    </p:extLst>
+  </p:cSld>
+  <p:clrMapOvr>
+    <a:masterClrMapping/>
+  </p:clrMapOvr>
+  <p:timing>
+    <p:tnLst>
+      <p:par>
+        <p:cTn id="1" dur="indefinite" restart="never" nodeType="tmRoot"/>
+      </p:par>
+    </p:tnLst>
+  </p:timing>
+</p:sld>
+</file>
+
+<file path=ppt/slides/slide14.xml><?xml version="1.0" encoding="utf-8"?>
+<p:sld xmlns:a="http://schemas.openxmlformats.org/drawingml/2006/main" xmlns:r="http://schemas.openxmlformats.org/officeDocument/2006/relationships" xmlns:p="http://schemas.openxmlformats.org/presentationml/2006/main">
+  <p:cSld>
+    <p:spTree>
+      <p:nvGrpSpPr>
+        <p:cNvPr id="1" name=""/>
+        <p:cNvGrpSpPr/>
+        <p:nvPr/>
+      </p:nvGrpSpPr>
+      <p:grpSpPr>
+        <a:xfrm>
+          <a:off x="0" y="0"/>
+          <a:ext cx="0" cy="0"/>
+          <a:chOff x="0" y="0"/>
+          <a:chExt cx="0" cy="0"/>
+        </a:xfrm>
+      </p:grpSpPr>
+      <p:sp>
+        <p:nvSpPr>
+          <p:cNvPr id="2" name="Title 1"/>
+          <p:cNvSpPr>
+            <a:spLocks noGrp="1"/>
+          </p:cNvSpPr>
+          <p:nvPr>
+            <p:ph type="title"/>
+          </p:nvPr>
+        </p:nvSpPr>
+        <p:spPr>
+          <a:xfrm>
+            <a:off x="990600" y="76200"/>
+            <a:ext cx="7125113" cy="924475"/>
+          </a:xfrm>
+        </p:spPr>
+        <p:txBody>
+          <a:bodyPr/>
+          <a:lstStyle/>
+          <a:p>
+            <a:r>
+              <a:rPr lang="en-US" dirty="0" smtClean="0"/>
+              <a:t>Layout</a:t>
+            </a:r>
+            <a:endParaRPr lang="en-US" dirty="0"/>
+          </a:p>
+        </p:txBody>
+      </p:sp>
+      <p:pic>
+        <p:nvPicPr>
+          <p:cNvPr id="4" name="Content Placeholder 3"/>
+          <p:cNvPicPr>
+            <a:picLocks noGrp="1"/>
+          </p:cNvPicPr>
+          <p:nvPr>
+            <p:ph idx="1"/>
+          </p:nvPr>
+        </p:nvPicPr>
+        <p:blipFill>
+          <a:blip r:embed="rId2">
+            <a:extLst>
+              <a:ext uri="{28A0092B-C50C-407E-A947-70E740481C1C}">
+                <a14:useLocalDpi xmlns:a14="http://schemas.microsoft.com/office/drawing/2010/main" val="0"/>
+              </a:ext>
+            </a:extLst>
+          </a:blip>
+          <a:srcRect/>
+          <a:stretch>
+            <a:fillRect/>
+          </a:stretch>
+        </p:blipFill>
+        <p:spPr bwMode="auto">
+          <a:xfrm>
+            <a:off x="0" y="762000"/>
+            <a:ext cx="9144000" cy="5181600"/>
+          </a:xfrm>
+          <a:prstGeom prst="rect">
+            <a:avLst/>
+          </a:prstGeom>
+          <a:noFill/>
+          <a:ln>
+            <a:noFill/>
+          </a:ln>
+        </p:spPr>
+      </p:pic>
+      <p:sp>
+        <p:nvSpPr>
+          <p:cNvPr id="5" name="Slide Number Placeholder 4"/>
           <p:cNvSpPr>
             <a:spLocks noGrp="1"/>
           </p:cNvSpPr>
@@ -9437,7 +9654,7 @@
     </p:spTree>
     <p:extLst>
       <p:ext uri="{BB962C8B-B14F-4D97-AF65-F5344CB8AC3E}">
-        <p14:creationId xmlns:p14="http://schemas.microsoft.com/office/powerpoint/2010/main" val="1339905903"/>
+        <p14:creationId xmlns:p14="http://schemas.microsoft.com/office/powerpoint/2010/main" val="1814363268"/>
       </p:ext>
     </p:extLst>
   </p:cSld>
@@ -9481,28 +9698,54 @@
             <p:ph type="title"/>
           </p:nvPr>
         </p:nvSpPr>
+        <p:spPr>
+          <a:xfrm>
+            <a:off x="1018968" y="0"/>
+            <a:ext cx="7125113" cy="924475"/>
+          </a:xfrm>
+        </p:spPr>
+        <p:txBody>
+          <a:bodyPr/>
+          <a:lstStyle/>
+          <a:p>
+            <a:r>
+              <a:rPr lang="en-US" dirty="0" smtClean="0"/>
+              <a:t>Milestones</a:t>
+            </a:r>
+            <a:endParaRPr lang="en-US" dirty="0"/>
+          </a:p>
+        </p:txBody>
+      </p:sp>
+      <p:sp>
+        <p:nvSpPr>
+          <p:cNvPr id="5" name="Slide Number Placeholder 4"/>
+          <p:cNvSpPr>
+            <a:spLocks noGrp="1"/>
+          </p:cNvSpPr>
+          <p:nvPr>
+            <p:ph type="sldNum" sz="quarter" idx="12"/>
+          </p:nvPr>
+        </p:nvSpPr>
         <p:spPr/>
         <p:txBody>
           <a:bodyPr/>
           <a:lstStyle/>
           <a:p>
-            <a:r>
-              <a:rPr lang="en-US" dirty="0" smtClean="0"/>
-              <a:t>Layout</a:t>
-            </a:r>
-            <a:endParaRPr lang="en-US" dirty="0"/>
+            <a:fld id="{7E6EE00F-83CB-43DE-ADF5-FEF2BD354890}" type="slidenum">
+              <a:rPr lang="en-US" smtClean="0"/>
+              <a:t>15</a:t>
+            </a:fld>
+            <a:endParaRPr lang="en-US"/>
           </a:p>
         </p:txBody>
       </p:sp>
       <p:pic>
         <p:nvPicPr>
-          <p:cNvPr id="4" name="Content Placeholder 3"/>
+          <p:cNvPr id="7170" name="Picture 2"/>
           <p:cNvPicPr>
-            <a:picLocks noGrp="1"/>
+            <a:picLocks noChangeAspect="1" noChangeArrowheads="1"/>
           </p:cNvPicPr>
-          <p:nvPr>
-            <p:ph idx="1"/>
-          </p:nvPr>
+          <p:nvPr/>
         </p:nvPicPr>
         <p:blipFill>
           <a:blip r:embed="rId2">
@@ -9519,8 +9762,8 @@
         </p:blipFill>
         <p:spPr bwMode="auto">
           <a:xfrm>
-            <a:off x="2056626" y="1806575"/>
-            <a:ext cx="5030747" cy="4052888"/>
+            <a:off x="304800" y="695325"/>
+            <a:ext cx="8424862" cy="5253149"/>
           </a:xfrm>
           <a:prstGeom prst="rect">
             <a:avLst/>
@@ -9529,35 +9772,41 @@
           <a:ln>
             <a:noFill/>
           </a:ln>
+          <a:effectLst/>
+          <a:extLst>
+            <a:ext uri="{909E8E84-426E-40DD-AFC4-6F175D3DCCD1}">
+              <a14:hiddenFill xmlns:a14="http://schemas.microsoft.com/office/drawing/2010/main">
+                <a:solidFill>
+                  <a:schemeClr val="accent1"/>
+                </a:solidFill>
+              </a14:hiddenFill>
+            </a:ext>
+            <a:ext uri="{91240B29-F687-4F45-9708-019B960494DF}">
+              <a14:hiddenLine xmlns:a14="http://schemas.microsoft.com/office/drawing/2010/main" w="9525">
+                <a:solidFill>
+                  <a:schemeClr val="tx1"/>
+                </a:solidFill>
+                <a:miter lim="800000"/>
+                <a:headEnd/>
+                <a:tailEnd/>
+              </a14:hiddenLine>
+            </a:ext>
+            <a:ext uri="{AF507438-7753-43E0-B8FC-AC1667EBCBE1}">
+              <a14:hiddenEffects xmlns:a14="http://schemas.microsoft.com/office/drawing/2010/main">
+                <a:effectLst>
+                  <a:outerShdw dist="35921" dir="2700000" algn="ctr" rotWithShape="0">
+                    <a:schemeClr val="bg2"/>
+                  </a:outerShdw>
+                </a:effectLst>
+              </a14:hiddenEffects>
+            </a:ext>
+          </a:extLst>
         </p:spPr>
       </p:pic>
-      <p:sp>
-        <p:nvSpPr>
-          <p:cNvPr id="5" name="Slide Number Placeholder 4"/>
-          <p:cNvSpPr>
-            <a:spLocks noGrp="1"/>
-          </p:cNvSpPr>
-          <p:nvPr>
-            <p:ph type="sldNum" sz="quarter" idx="12"/>
-          </p:nvPr>
-        </p:nvSpPr>
-        <p:spPr/>
-        <p:txBody>
-          <a:bodyPr/>
-          <a:lstStyle/>
-          <a:p>
-            <a:fld id="{7E6EE00F-83CB-43DE-ADF5-FEF2BD354890}" type="slidenum">
-              <a:rPr lang="en-US" smtClean="0"/>
-              <a:t>15</a:t>
-            </a:fld>
-            <a:endParaRPr lang="en-US"/>
-          </a:p>
-        </p:txBody>
-      </p:sp>
     </p:spTree>
     <p:extLst>
       <p:ext uri="{BB962C8B-B14F-4D97-AF65-F5344CB8AC3E}">
-        <p14:creationId xmlns:p14="http://schemas.microsoft.com/office/powerpoint/2010/main" val="1814363268"/>
+        <p14:creationId xmlns:p14="http://schemas.microsoft.com/office/powerpoint/2010/main" val="3578323970"/>
       </p:ext>
     </p:extLst>
   </p:cSld>
@@ -9601,28 +9850,54 @@
             <p:ph type="title"/>
           </p:nvPr>
         </p:nvSpPr>
+        <p:spPr>
+          <a:xfrm>
+            <a:off x="990600" y="152400"/>
+            <a:ext cx="7125113" cy="924475"/>
+          </a:xfrm>
+        </p:spPr>
+        <p:txBody>
+          <a:bodyPr/>
+          <a:lstStyle/>
+          <a:p>
+            <a:r>
+              <a:rPr lang="en-US" dirty="0" smtClean="0"/>
+              <a:t>Statement of Feasibility</a:t>
+            </a:r>
+            <a:endParaRPr lang="en-US" dirty="0"/>
+          </a:p>
+        </p:txBody>
+      </p:sp>
+      <p:sp>
+        <p:nvSpPr>
+          <p:cNvPr id="4" name="Slide Number Placeholder 3"/>
+          <p:cNvSpPr>
+            <a:spLocks noGrp="1"/>
+          </p:cNvSpPr>
+          <p:nvPr>
+            <p:ph type="sldNum" sz="quarter" idx="12"/>
+          </p:nvPr>
+        </p:nvSpPr>
         <p:spPr/>
         <p:txBody>
           <a:bodyPr/>
           <a:lstStyle/>
           <a:p>
-            <a:r>
-              <a:rPr lang="en-US" dirty="0" smtClean="0"/>
-              <a:t>Milestones</a:t>
-            </a:r>
-            <a:endParaRPr lang="en-US" dirty="0"/>
+            <a:fld id="{7E6EE00F-83CB-43DE-ADF5-FEF2BD354890}" type="slidenum">
+              <a:rPr lang="en-US" smtClean="0"/>
+              <a:t>16</a:t>
+            </a:fld>
+            <a:endParaRPr lang="en-US"/>
           </a:p>
         </p:txBody>
       </p:sp>
       <p:pic>
         <p:nvPicPr>
-          <p:cNvPr id="4" name="Content Placeholder 3"/>
+          <p:cNvPr id="6146" name="Picture 2" descr="http://4.bp.blogspot.com/-I7rE8-jZ1OA/UCAfrBkJMRI/AAAAAAAAFMM/w7fnHv3MKCI/s1600/mission-accomplished.jpg"/>
           <p:cNvPicPr>
-            <a:picLocks noGrp="1"/>
+            <a:picLocks noChangeAspect="1" noChangeArrowheads="1"/>
           </p:cNvPicPr>
-          <p:nvPr>
-            <p:ph idx="1"/>
-          </p:nvPr>
+          <p:nvPr/>
         </p:nvPicPr>
         <p:blipFill>
           <a:blip r:embed="rId2">
@@ -9639,151 +9914,8 @@
         </p:blipFill>
         <p:spPr bwMode="auto">
           <a:xfrm>
-            <a:off x="1009650" y="1926502"/>
-            <a:ext cx="7124700" cy="3813033"/>
-          </a:xfrm>
-          <a:prstGeom prst="rect">
-            <a:avLst/>
-          </a:prstGeom>
-          <a:noFill/>
-          <a:ln>
-            <a:noFill/>
-          </a:ln>
-        </p:spPr>
-      </p:pic>
-      <p:sp>
-        <p:nvSpPr>
-          <p:cNvPr id="5" name="Slide Number Placeholder 4"/>
-          <p:cNvSpPr>
-            <a:spLocks noGrp="1"/>
-          </p:cNvSpPr>
-          <p:nvPr>
-            <p:ph type="sldNum" sz="quarter" idx="12"/>
-          </p:nvPr>
-        </p:nvSpPr>
-        <p:spPr/>
-        <p:txBody>
-          <a:bodyPr/>
-          <a:lstStyle/>
-          <a:p>
-            <a:fld id="{7E6EE00F-83CB-43DE-ADF5-FEF2BD354890}" type="slidenum">
-              <a:rPr lang="en-US" smtClean="0"/>
-              <a:t>16</a:t>
-            </a:fld>
-            <a:endParaRPr lang="en-US"/>
-          </a:p>
-        </p:txBody>
-      </p:sp>
-    </p:spTree>
-    <p:extLst>
-      <p:ext uri="{BB962C8B-B14F-4D97-AF65-F5344CB8AC3E}">
-        <p14:creationId xmlns:p14="http://schemas.microsoft.com/office/powerpoint/2010/main" val="3578323970"/>
-      </p:ext>
-    </p:extLst>
-  </p:cSld>
-  <p:clrMapOvr>
-    <a:masterClrMapping/>
-  </p:clrMapOvr>
-  <p:timing>
-    <p:tnLst>
-      <p:par>
-        <p:cTn id="1" dur="indefinite" restart="never" nodeType="tmRoot"/>
-      </p:par>
-    </p:tnLst>
-  </p:timing>
-</p:sld>
-</file>
-
-<file path=ppt/slides/slide17.xml><?xml version="1.0" encoding="utf-8"?>
-<p:sld xmlns:a="http://schemas.openxmlformats.org/drawingml/2006/main" xmlns:r="http://schemas.openxmlformats.org/officeDocument/2006/relationships" xmlns:p="http://schemas.openxmlformats.org/presentationml/2006/main">
-  <p:cSld>
-    <p:spTree>
-      <p:nvGrpSpPr>
-        <p:cNvPr id="1" name=""/>
-        <p:cNvGrpSpPr/>
-        <p:nvPr/>
-      </p:nvGrpSpPr>
-      <p:grpSpPr>
-        <a:xfrm>
-          <a:off x="0" y="0"/>
-          <a:ext cx="0" cy="0"/>
-          <a:chOff x="0" y="0"/>
-          <a:chExt cx="0" cy="0"/>
-        </a:xfrm>
-      </p:grpSpPr>
-      <p:sp>
-        <p:nvSpPr>
-          <p:cNvPr id="2" name="Title 1"/>
-          <p:cNvSpPr>
-            <a:spLocks noGrp="1"/>
-          </p:cNvSpPr>
-          <p:nvPr>
-            <p:ph type="title"/>
-          </p:nvPr>
-        </p:nvSpPr>
-        <p:spPr/>
-        <p:txBody>
-          <a:bodyPr/>
-          <a:lstStyle/>
-          <a:p>
-            <a:r>
-              <a:rPr lang="en-US" dirty="0" smtClean="0"/>
-              <a:t>Statement of Feasibility</a:t>
-            </a:r>
-            <a:endParaRPr lang="en-US" dirty="0"/>
-          </a:p>
-        </p:txBody>
-      </p:sp>
-      <p:sp>
-        <p:nvSpPr>
-          <p:cNvPr id="4" name="Slide Number Placeholder 3"/>
-          <p:cNvSpPr>
-            <a:spLocks noGrp="1"/>
-          </p:cNvSpPr>
-          <p:nvPr>
-            <p:ph type="sldNum" sz="quarter" idx="12"/>
-          </p:nvPr>
-        </p:nvSpPr>
-        <p:spPr/>
-        <p:txBody>
-          <a:bodyPr/>
-          <a:lstStyle/>
-          <a:p>
-            <a:fld id="{7E6EE00F-83CB-43DE-ADF5-FEF2BD354890}" type="slidenum">
-              <a:rPr lang="en-US" smtClean="0"/>
-              <a:t>17</a:t>
-            </a:fld>
-            <a:endParaRPr lang="en-US"/>
-          </a:p>
-        </p:txBody>
-      </p:sp>
-      <p:pic>
-        <p:nvPicPr>
-          <p:cNvPr id="10242" name="Picture 2" descr="http://www.newworldorderwar.com/wp-content/uploads/2010/12/obama-yes-we-can_04-nov-08.jpg"/>
-          <p:cNvPicPr>
-            <a:picLocks noGrp="1" noChangeAspect="1" noChangeArrowheads="1"/>
-          </p:cNvPicPr>
-          <p:nvPr>
-            <p:ph idx="1"/>
-          </p:nvPr>
-        </p:nvPicPr>
-        <p:blipFill>
-          <a:blip r:embed="rId2">
-            <a:extLst>
-              <a:ext uri="{28A0092B-C50C-407E-A947-70E740481C1C}">
-                <a14:useLocalDpi xmlns:a14="http://schemas.microsoft.com/office/drawing/2010/main" val="0"/>
-              </a:ext>
-            </a:extLst>
-          </a:blip>
-          <a:srcRect/>
-          <a:stretch>
-            <a:fillRect/>
-          </a:stretch>
-        </p:blipFill>
-        <p:spPr bwMode="auto">
-          <a:xfrm>
-            <a:off x="3218022" y="1806575"/>
-            <a:ext cx="2707956" cy="4052888"/>
+            <a:off x="2438400" y="1495425"/>
+            <a:ext cx="4448175" cy="4848225"/>
           </a:xfrm>
           <a:prstGeom prst="rect">
             <a:avLst/>
@@ -9820,7 +9952,7 @@
 </p:sld>
 </file>
 
-<file path=ppt/slides/slide18.xml><?xml version="1.0" encoding="utf-8"?>
+<file path=ppt/slides/slide17.xml><?xml version="1.0" encoding="utf-8"?>
 <p:sld xmlns:a="http://schemas.openxmlformats.org/drawingml/2006/main" xmlns:r="http://schemas.openxmlformats.org/officeDocument/2006/relationships" xmlns:p="http://schemas.openxmlformats.org/presentationml/2006/main">
   <p:cSld>
     <p:spTree>
@@ -9854,32 +9986,6 @@
           <a:p>
             <a:r>
               <a:rPr lang="en-US" dirty="0" smtClean="0"/>
-              <a:t>The End</a:t>
-            </a:r>
-            <a:endParaRPr lang="en-US" dirty="0"/>
-          </a:p>
-        </p:txBody>
-      </p:sp>
-      <p:sp>
-        <p:nvSpPr>
-          <p:cNvPr id="3" name="Content Placeholder 2"/>
-          <p:cNvSpPr>
-            <a:spLocks noGrp="1"/>
-          </p:cNvSpPr>
-          <p:nvPr>
-            <p:ph idx="1"/>
-          </p:nvPr>
-        </p:nvSpPr>
-        <p:spPr/>
-        <p:txBody>
-          <a:bodyPr/>
-          <a:lstStyle/>
-          <a:p>
-            <a:pPr marL="0" indent="0" algn="ctr">
-              <a:buNone/>
-            </a:pPr>
-            <a:r>
-              <a:rPr lang="en-US" dirty="0" smtClean="0"/>
               <a:t>Questions?</a:t>
             </a:r>
             <a:endParaRPr lang="en-US" dirty="0"/>
@@ -9903,12 +10009,53 @@
           <a:p>
             <a:fld id="{7E6EE00F-83CB-43DE-ADF5-FEF2BD354890}" type="slidenum">
               <a:rPr lang="en-US" smtClean="0"/>
-              <a:t>18</a:t>
+              <a:t>17</a:t>
             </a:fld>
             <a:endParaRPr lang="en-US"/>
           </a:p>
         </p:txBody>
       </p:sp>
+      <p:pic>
+        <p:nvPicPr>
+          <p:cNvPr id="8194" name="Picture 2" descr="http://www.novinite.com/media/images/2011-05/photo_verybig_127903.jpg"/>
+          <p:cNvPicPr>
+            <a:picLocks noChangeAspect="1" noChangeArrowheads="1"/>
+          </p:cNvPicPr>
+          <p:nvPr/>
+        </p:nvPicPr>
+        <p:blipFill>
+          <a:blip r:embed="rId2">
+            <a:extLst>
+              <a:ext uri="{28A0092B-C50C-407E-A947-70E740481C1C}">
+                <a14:useLocalDpi xmlns:a14="http://schemas.microsoft.com/office/drawing/2010/main" val="0"/>
+              </a:ext>
+            </a:extLst>
+          </a:blip>
+          <a:srcRect/>
+          <a:stretch>
+            <a:fillRect/>
+          </a:stretch>
+        </p:blipFill>
+        <p:spPr bwMode="auto">
+          <a:xfrm>
+            <a:off x="838200" y="1524000"/>
+            <a:ext cx="7927114" cy="4343400"/>
+          </a:xfrm>
+          <a:prstGeom prst="rect">
+            <a:avLst/>
+          </a:prstGeom>
+          <a:noFill/>
+          <a:extLst>
+            <a:ext uri="{909E8E84-426E-40DD-AFC4-6F175D3DCCD1}">
+              <a14:hiddenFill xmlns:a14="http://schemas.microsoft.com/office/drawing/2010/main">
+                <a:solidFill>
+                  <a:srgbClr val="FFFFFF"/>
+                </a:solidFill>
+              </a14:hiddenFill>
+            </a:ext>
+          </a:extLst>
+        </p:spPr>
+      </p:pic>
     </p:spTree>
     <p:extLst>
       <p:ext uri="{BB962C8B-B14F-4D97-AF65-F5344CB8AC3E}">
@@ -10064,11 +10211,11 @@
   <p:clrMapOvr>
     <a:masterClrMapping/>
   </p:clrMapOvr>
-  <mc:AlternateContent xmlns:mc="http://schemas.openxmlformats.org/markup-compatibility/2006">
-    <mc:Choice xmlns:p14="http://schemas.microsoft.com/office/powerpoint/2010/main" Requires="p14">
+  <mc:AlternateContent xmlns:mc="http://schemas.openxmlformats.org/markup-compatibility/2006" xmlns:p14="http://schemas.microsoft.com/office/powerpoint/2010/main">
+    <mc:Choice Requires="p14">
       <p:transition spd="slow" p14:dur="2000"/>
     </mc:Choice>
-    <mc:Fallback>
+    <mc:Fallback xmlns="">
       <p:transition spd="slow"/>
     </mc:Fallback>
   </mc:AlternateContent>
@@ -10793,7 +10940,12 @@
             <p:ph idx="1"/>
           </p:nvPr>
         </p:nvSpPr>
-        <p:spPr/>
+        <p:spPr>
+          <a:xfrm>
+            <a:off x="1009443" y="1807361"/>
+            <a:ext cx="7125112" cy="2383639"/>
+          </a:xfrm>
+        </p:spPr>
         <p:txBody>
           <a:bodyPr/>
           <a:lstStyle/>
@@ -10945,7 +11097,7 @@
           <a:p>
             <a:r>
               <a:rPr lang="en-US" dirty="0" smtClean="0"/>
-              <a:t>Background Info</a:t>
+              <a:t>Goals</a:t>
             </a:r>
             <a:endParaRPr lang="en-US" dirty="0"/>
           </a:p>
@@ -10968,7 +11120,63 @@
           <a:p>
             <a:r>
               <a:rPr lang="en-US" dirty="0" smtClean="0"/>
-              <a:t>Here is some sample audio recorded off the air.</a:t>
+              <a:t>Modern</a:t>
+            </a:r>
+          </a:p>
+          <a:p>
+            <a:r>
+              <a:rPr lang="en-US" dirty="0" smtClean="0"/>
+              <a:t>Reliable</a:t>
+            </a:r>
+          </a:p>
+          <a:p>
+            <a:r>
+              <a:rPr lang="en-US" dirty="0" smtClean="0"/>
+              <a:t>Low-cost</a:t>
+            </a:r>
+          </a:p>
+          <a:p>
+            <a:r>
+              <a:rPr lang="en-US" dirty="0" smtClean="0"/>
+              <a:t>Easy </a:t>
+            </a:r>
+            <a:r>
+              <a:rPr lang="en-US" dirty="0"/>
+              <a:t>to </a:t>
+            </a:r>
+            <a:r>
+              <a:rPr lang="en-US" dirty="0" smtClean="0"/>
+              <a:t>use</a:t>
+            </a:r>
+          </a:p>
+          <a:p>
+            <a:r>
+              <a:rPr lang="en-US" dirty="0"/>
+              <a:t>O</a:t>
+            </a:r>
+            <a:r>
+              <a:rPr lang="en-US" dirty="0" smtClean="0"/>
+              <a:t>pen design</a:t>
+            </a:r>
+          </a:p>
+          <a:p>
+            <a:r>
+              <a:rPr lang="en-US" dirty="0" smtClean="0"/>
+              <a:t>Small </a:t>
+            </a:r>
+            <a:r>
+              <a:rPr lang="en-US" dirty="0"/>
+              <a:t>form </a:t>
+            </a:r>
+            <a:r>
+              <a:rPr lang="en-US" dirty="0" smtClean="0"/>
+              <a:t>factor</a:t>
+            </a:r>
+          </a:p>
+          <a:p>
+            <a:r>
+              <a:rPr lang="en-US" dirty="0" smtClean="0"/>
+              <a:t>Portable version</a:t>
             </a:r>
             <a:endParaRPr lang="en-US" dirty="0"/>
           </a:p>
@@ -11000,7 +11208,7 @@
     </p:spTree>
     <p:extLst>
       <p:ext uri="{BB962C8B-B14F-4D97-AF65-F5344CB8AC3E}">
-        <p14:creationId xmlns:p14="http://schemas.microsoft.com/office/powerpoint/2010/main" val="3104887733"/>
+        <p14:creationId xmlns:p14="http://schemas.microsoft.com/office/powerpoint/2010/main" val="1942111147"/>
       </p:ext>
     </p:extLst>
   </p:cSld>
@@ -11051,94 +11259,48 @@
           <a:p>
             <a:r>
               <a:rPr lang="en-US" dirty="0" smtClean="0"/>
-              <a:t>Goals</a:t>
+              <a:t>High Level Block Diagram</a:t>
             </a:r>
             <a:endParaRPr lang="en-US" dirty="0"/>
           </a:p>
         </p:txBody>
       </p:sp>
-      <p:sp>
-        <p:nvSpPr>
-          <p:cNvPr id="3" name="Content Placeholder 2"/>
-          <p:cNvSpPr>
-            <a:spLocks noGrp="1"/>
-          </p:cNvSpPr>
-          <p:nvPr>
-            <p:ph idx="1"/>
-          </p:nvPr>
-        </p:nvSpPr>
-        <p:spPr/>
-        <p:txBody>
-          <a:bodyPr/>
-          <a:lstStyle/>
-          <a:p>
-            <a:r>
-              <a:rPr lang="en-US" dirty="0" smtClean="0"/>
-              <a:t>Modern</a:t>
-            </a:r>
-          </a:p>
-          <a:p>
-            <a:r>
-              <a:rPr lang="en-US" dirty="0" smtClean="0"/>
-              <a:t>Reliable</a:t>
-            </a:r>
-          </a:p>
-          <a:p>
-            <a:r>
-              <a:rPr lang="en-US" dirty="0" smtClean="0"/>
-              <a:t>Low-cost</a:t>
-            </a:r>
-          </a:p>
-          <a:p>
-            <a:r>
-              <a:rPr lang="en-US" dirty="0" smtClean="0"/>
-              <a:t>Easy </a:t>
-            </a:r>
-            <a:r>
-              <a:rPr lang="en-US" dirty="0"/>
-              <a:t>to </a:t>
-            </a:r>
-            <a:r>
-              <a:rPr lang="en-US" dirty="0" smtClean="0"/>
-              <a:t>use</a:t>
-            </a:r>
-          </a:p>
-          <a:p>
-            <a:r>
-              <a:rPr lang="en-US" dirty="0"/>
-              <a:t>O</a:t>
-            </a:r>
-            <a:r>
-              <a:rPr lang="en-US" dirty="0" smtClean="0"/>
-              <a:t>pen design</a:t>
-            </a:r>
-          </a:p>
-          <a:p>
-            <a:r>
-              <a:rPr lang="en-US" dirty="0" smtClean="0"/>
-              <a:t>Small </a:t>
-            </a:r>
-            <a:r>
-              <a:rPr lang="en-US" dirty="0"/>
-              <a:t>form </a:t>
-            </a:r>
-            <a:r>
-              <a:rPr lang="en-US" dirty="0" smtClean="0"/>
-              <a:t>factor</a:t>
-            </a:r>
-          </a:p>
-          <a:p>
-            <a:r>
-              <a:rPr lang="en-US" dirty="0" smtClean="0"/>
-              <a:t>Portable version</a:t>
-            </a:r>
-            <a:endParaRPr lang="en-US" dirty="0"/>
-          </a:p>
-        </p:txBody>
-      </p:sp>
-      <p:sp>
-        <p:nvSpPr>
-          <p:cNvPr id="4" name="Slide Number Placeholder 3"/>
+      <p:pic>
+        <p:nvPicPr>
+          <p:cNvPr id="6" name="Picture 5"/>
+          <p:cNvPicPr/>
+          <p:nvPr/>
+        </p:nvPicPr>
+        <p:blipFill>
+          <a:blip r:embed="rId2" cstate="print">
+            <a:extLst>
+              <a:ext uri="{28A0092B-C50C-407E-A947-70E740481C1C}">
+                <a14:useLocalDpi xmlns:a14="http://schemas.microsoft.com/office/drawing/2010/main" val="0"/>
+              </a:ext>
+            </a:extLst>
+          </a:blip>
+          <a:srcRect/>
+          <a:stretch>
+            <a:fillRect/>
+          </a:stretch>
+        </p:blipFill>
+        <p:spPr bwMode="auto">
+          <a:xfrm>
+            <a:off x="1372340" y="1828800"/>
+            <a:ext cx="5943600" cy="4563745"/>
+          </a:xfrm>
+          <a:prstGeom prst="rect">
+            <a:avLst/>
+          </a:prstGeom>
+          <a:noFill/>
+          <a:ln>
+            <a:noFill/>
+          </a:ln>
+        </p:spPr>
+      </p:pic>
+      <p:sp>
+        <p:nvSpPr>
+          <p:cNvPr id="7" name="Slide Number Placeholder 6"/>
           <p:cNvSpPr>
             <a:spLocks noGrp="1"/>
           </p:cNvSpPr>
@@ -11162,7 +11324,7 @@
     </p:spTree>
     <p:extLst>
       <p:ext uri="{BB962C8B-B14F-4D97-AF65-F5344CB8AC3E}">
-        <p14:creationId xmlns:p14="http://schemas.microsoft.com/office/powerpoint/2010/main" val="1942111147"/>
+        <p14:creationId xmlns:p14="http://schemas.microsoft.com/office/powerpoint/2010/main" val="2983298933"/>
       </p:ext>
     </p:extLst>
   </p:cSld>

</xml_diff>